<commit_message>
added slide about perf, size
</commit_message>
<xml_diff>
--- a/whyc.pptx
+++ b/whyc.pptx
@@ -5,7 +5,7 @@
     <p:sldMasterId id="2147483708" r:id="rId1"/>
   </p:sldMasterIdLst>
   <p:notesMasterIdLst>
-    <p:notesMasterId r:id="rId25"/>
+    <p:notesMasterId r:id="rId24"/>
   </p:notesMasterIdLst>
   <p:sldIdLst>
     <p:sldId id="256" r:id="rId2"/>
@@ -15,22 +15,21 @@
     <p:sldId id="278" r:id="rId6"/>
     <p:sldId id="257" r:id="rId7"/>
     <p:sldId id="270" r:id="rId8"/>
-    <p:sldId id="272" r:id="rId9"/>
-    <p:sldId id="258" r:id="rId10"/>
-    <p:sldId id="259" r:id="rId11"/>
-    <p:sldId id="267" r:id="rId12"/>
-    <p:sldId id="268" r:id="rId13"/>
-    <p:sldId id="269" r:id="rId14"/>
-    <p:sldId id="261" r:id="rId15"/>
-    <p:sldId id="280" r:id="rId16"/>
-    <p:sldId id="281" r:id="rId17"/>
-    <p:sldId id="264" r:id="rId18"/>
-    <p:sldId id="273" r:id="rId19"/>
-    <p:sldId id="274" r:id="rId20"/>
-    <p:sldId id="275" r:id="rId21"/>
-    <p:sldId id="276" r:id="rId22"/>
-    <p:sldId id="262" r:id="rId23"/>
-    <p:sldId id="263" r:id="rId24"/>
+    <p:sldId id="258" r:id="rId9"/>
+    <p:sldId id="259" r:id="rId10"/>
+    <p:sldId id="267" r:id="rId11"/>
+    <p:sldId id="268" r:id="rId12"/>
+    <p:sldId id="269" r:id="rId13"/>
+    <p:sldId id="282" r:id="rId14"/>
+    <p:sldId id="280" r:id="rId15"/>
+    <p:sldId id="281" r:id="rId16"/>
+    <p:sldId id="264" r:id="rId17"/>
+    <p:sldId id="273" r:id="rId18"/>
+    <p:sldId id="274" r:id="rId19"/>
+    <p:sldId id="275" r:id="rId20"/>
+    <p:sldId id="276" r:id="rId21"/>
+    <p:sldId id="262" r:id="rId22"/>
+    <p:sldId id="263" r:id="rId23"/>
   </p:sldIdLst>
   <p:sldSz cx="9144000" cy="6858000" type="screen4x3"/>
   <p:notesSz cx="6858000" cy="9144000"/>
@@ -214,7 +213,7 @@
           <a:p>
             <a:fld id="{9A80B892-1877-4E96-B79B-59D023863A1F}" type="datetimeFigureOut">
               <a:rPr lang="en-US" smtClean="0"/>
-              <a:t>1/21/2018</a:t>
+              <a:t>3/8/2018</a:t>
             </a:fld>
             <a:endParaRPr lang="en-US"/>
           </a:p>
@@ -812,7 +811,7 @@
           <a:p>
             <a:fld id="{5CBAD53C-CF50-4B7F-A788-4CF6E1C1EACE}" type="slidenum">
               <a:rPr lang="en-US" smtClean="0"/>
-              <a:t>9</a:t>
+              <a:t>8</a:t>
             </a:fld>
             <a:endParaRPr lang="en-US"/>
           </a:p>
@@ -971,7 +970,7 @@
           <a:p>
             <a:fld id="{5CBAD53C-CF50-4B7F-A788-4CF6E1C1EACE}" type="slidenum">
               <a:rPr lang="en-US" smtClean="0"/>
-              <a:t>17</a:t>
+              <a:t>16</a:t>
             </a:fld>
             <a:endParaRPr lang="en-US"/>
           </a:p>
@@ -1226,7 +1225,7 @@
           <a:p>
             <a:fld id="{FB0CBA01-42FA-46E7-8F8A-F4C98A748411}" type="datetimeFigureOut">
               <a:rPr lang="en-US" smtClean="0"/>
-              <a:t>1/21/2018</a:t>
+              <a:t>3/8/2018</a:t>
             </a:fld>
             <a:endParaRPr lang="en-US"/>
           </a:p>
@@ -1504,7 +1503,7 @@
           <a:p>
             <a:fld id="{FB0CBA01-42FA-46E7-8F8A-F4C98A748411}" type="datetimeFigureOut">
               <a:rPr lang="en-US" smtClean="0"/>
-              <a:t>1/21/2018</a:t>
+              <a:t>3/8/2018</a:t>
             </a:fld>
             <a:endParaRPr lang="en-US"/>
           </a:p>
@@ -1727,7 +1726,7 @@
           <a:p>
             <a:fld id="{FB0CBA01-42FA-46E7-8F8A-F4C98A748411}" type="datetimeFigureOut">
               <a:rPr lang="en-US" smtClean="0"/>
-              <a:t>1/21/2018</a:t>
+              <a:t>3/8/2018</a:t>
             </a:fld>
             <a:endParaRPr lang="en-US"/>
           </a:p>
@@ -1922,7 +1921,7 @@
           <a:p>
             <a:fld id="{FB0CBA01-42FA-46E7-8F8A-F4C98A748411}" type="datetimeFigureOut">
               <a:rPr lang="en-US" smtClean="0"/>
-              <a:t>1/21/2018</a:t>
+              <a:t>3/8/2018</a:t>
             </a:fld>
             <a:endParaRPr lang="en-US"/>
           </a:p>
@@ -2202,7 +2201,7 @@
           <a:p>
             <a:fld id="{FB0CBA01-42FA-46E7-8F8A-F4C98A748411}" type="datetimeFigureOut">
               <a:rPr lang="en-US" smtClean="0"/>
-              <a:t>1/21/2018</a:t>
+              <a:t>3/8/2018</a:t>
             </a:fld>
             <a:endParaRPr lang="en-US"/>
           </a:p>
@@ -2675,7 +2674,7 @@
           <a:p>
             <a:fld id="{FB0CBA01-42FA-46E7-8F8A-F4C98A748411}" type="datetimeFigureOut">
               <a:rPr lang="en-US" smtClean="0"/>
-              <a:t>1/21/2018</a:t>
+              <a:t>3/8/2018</a:t>
             </a:fld>
             <a:endParaRPr lang="en-US"/>
           </a:p>
@@ -3130,7 +3129,7 @@
           <a:p>
             <a:fld id="{FB0CBA01-42FA-46E7-8F8A-F4C98A748411}" type="datetimeFigureOut">
               <a:rPr lang="en-US" smtClean="0"/>
-              <a:t>1/21/2018</a:t>
+              <a:t>3/8/2018</a:t>
             </a:fld>
             <a:endParaRPr lang="en-US"/>
           </a:p>
@@ -3268,7 +3267,7 @@
           <a:p>
             <a:fld id="{FB0CBA01-42FA-46E7-8F8A-F4C98A748411}" type="datetimeFigureOut">
               <a:rPr lang="en-US" smtClean="0"/>
-              <a:t>1/21/2018</a:t>
+              <a:t>3/8/2018</a:t>
             </a:fld>
             <a:endParaRPr lang="en-US"/>
           </a:p>
@@ -3429,7 +3428,7 @@
           <a:p>
             <a:fld id="{FB0CBA01-42FA-46E7-8F8A-F4C98A748411}" type="datetimeFigureOut">
               <a:rPr lang="en-US" smtClean="0"/>
-              <a:t>1/21/2018</a:t>
+              <a:t>3/8/2018</a:t>
             </a:fld>
             <a:endParaRPr lang="en-US"/>
           </a:p>
@@ -3823,7 +3822,7 @@
           <a:p>
             <a:fld id="{FB0CBA01-42FA-46E7-8F8A-F4C98A748411}" type="datetimeFigureOut">
               <a:rPr lang="en-US" smtClean="0"/>
-              <a:t>1/21/2018</a:t>
+              <a:t>3/8/2018</a:t>
             </a:fld>
             <a:endParaRPr lang="en-US"/>
           </a:p>
@@ -4223,7 +4222,7 @@
           <a:p>
             <a:fld id="{FB0CBA01-42FA-46E7-8F8A-F4C98A748411}" type="datetimeFigureOut">
               <a:rPr lang="en-US" smtClean="0"/>
-              <a:t>1/21/2018</a:t>
+              <a:t>3/8/2018</a:t>
             </a:fld>
             <a:endParaRPr lang="en-US"/>
           </a:p>
@@ -4433,7 +4432,7 @@
           <a:p>
             <a:fld id="{FB0CBA01-42FA-46E7-8F8A-F4C98A748411}" type="datetimeFigureOut">
               <a:rPr lang="en-US" smtClean="0"/>
-              <a:t>1/21/2018</a:t>
+              <a:t>3/8/2018</a:t>
             </a:fld>
             <a:endParaRPr lang="en-US"/>
           </a:p>
@@ -4902,22 +4901,14 @@
           <a:p>
             <a:r>
               <a:rPr lang="en-US" dirty="0" smtClean="0"/>
-              <a:t>Why </a:t>
-            </a:r>
-            <a:r>
-              <a:rPr lang="en-US" dirty="0" smtClean="0"/>
-              <a:t>C? </a:t>
+              <a:t>Why C? </a:t>
             </a:r>
             <a:br>
               <a:rPr lang="en-US" dirty="0" smtClean="0"/>
             </a:br>
             <a:r>
               <a:rPr lang="en-US" dirty="0" smtClean="0"/>
-              <a:t>Refuting C++ </a:t>
-            </a:r>
-            <a:r>
-              <a:rPr lang="en-US" dirty="0" smtClean="0"/>
-              <a:t>Pretentiousness</a:t>
+              <a:t>Refuting C++ Pretentiousness</a:t>
             </a:r>
             <a:endParaRPr lang="en-US" dirty="0"/>
           </a:p>
@@ -4955,7 +4946,7 @@
       </p:grpSpPr>
       <p:sp>
         <p:nvSpPr>
-          <p:cNvPr id="3" name="Content Placeholder 2"/>
+          <p:cNvPr id="2" name="Content Placeholder 1"/>
           <p:cNvSpPr>
             <a:spLocks noGrp="1"/>
           </p:cNvSpPr>
@@ -4965,107 +4956,60 @@
         </p:nvSpPr>
         <p:spPr/>
         <p:txBody>
-          <a:bodyPr>
-            <a:normAutofit/>
-          </a:bodyPr>
-          <a:lstStyle/>
-          <a:p>
-            <a:r>
-              <a:rPr lang="en-US" dirty="0" smtClean="0"/>
-              <a:t>Popular </a:t>
-            </a:r>
-            <a:r>
-              <a:rPr lang="en-US" dirty="0"/>
-              <a:t>in the Microcontroller realm</a:t>
-            </a:r>
-          </a:p>
-          <a:p>
-            <a:r>
-              <a:rPr lang="en-US" dirty="0" smtClean="0"/>
-              <a:t>Approved by Mission Critical Standards</a:t>
-            </a:r>
-          </a:p>
-          <a:p>
-            <a:pPr lvl="1"/>
-            <a:r>
-              <a:rPr lang="en-US" dirty="0" smtClean="0"/>
-              <a:t>Modern C++ is not allowed by MISRA etc.</a:t>
-            </a:r>
-          </a:p>
-          <a:p>
-            <a:pPr lvl="1"/>
-            <a:r>
-              <a:rPr lang="en-US" dirty="0" smtClean="0"/>
-              <a:t>IAR Embedded Workbench C++98/03</a:t>
-            </a:r>
-          </a:p>
-          <a:p>
-            <a:r>
-              <a:rPr lang="en-US" dirty="0" smtClean="0"/>
-              <a:t>C is able to implement C++ features</a:t>
-            </a:r>
-          </a:p>
-          <a:p>
-            <a:pPr lvl="1"/>
-            <a:r>
-              <a:rPr lang="en-US" dirty="0" err="1" smtClean="0"/>
-              <a:t>Pimpl</a:t>
-            </a:r>
-            <a:r>
-              <a:rPr lang="en-US" dirty="0" smtClean="0"/>
-              <a:t> idiom (interfaces)</a:t>
-            </a:r>
-          </a:p>
-          <a:p>
-            <a:pPr lvl="1"/>
-            <a:r>
-              <a:rPr lang="en-US" dirty="0" smtClean="0"/>
-              <a:t>Generics, polymorphism</a:t>
-            </a:r>
-          </a:p>
-          <a:p>
-            <a:pPr lvl="1"/>
+          <a:bodyPr/>
+          <a:lstStyle/>
+          <a:p>
+            <a:pPr marL="285750" indent="-285750">
+              <a:buFont typeface="Arial" panose="020B0604020202020204" pitchFamily="34" charset="0"/>
+              <a:buChar char="•"/>
+            </a:pPr>
+            <a:r>
+              <a:rPr lang="en-US" dirty="0" smtClean="0"/>
+              <a:t>TRUST THE PROGRAMMER.</a:t>
+            </a:r>
+          </a:p>
+          <a:p>
+            <a:pPr marL="285750" indent="-285750">
+              <a:buFont typeface="Arial" panose="020B0604020202020204" pitchFamily="34" charset="0"/>
+              <a:buChar char="•"/>
+            </a:pPr>
+            <a:r>
+              <a:rPr lang="en-US" dirty="0" smtClean="0"/>
+              <a:t>Don’t prevent the programmer from doing what needs to be done.</a:t>
+            </a:r>
+          </a:p>
+          <a:p>
+            <a:pPr marL="285750" indent="-285750">
+              <a:buFont typeface="Arial" panose="020B0604020202020204" pitchFamily="34" charset="0"/>
+              <a:buChar char="•"/>
+            </a:pPr>
+            <a:r>
+              <a:rPr lang="en-US" dirty="0" smtClean="0"/>
+              <a:t>KEEP THE LANGUAGE SMALL AND SIMPLE</a:t>
+            </a:r>
+          </a:p>
+          <a:p>
+            <a:pPr marL="285750" indent="-285750">
+              <a:buFont typeface="Arial" panose="020B0604020202020204" pitchFamily="34" charset="0"/>
+              <a:buChar char="•"/>
+            </a:pPr>
+            <a:r>
+              <a:rPr lang="en-US" dirty="0" smtClean="0"/>
+              <a:t>Provide only one way to do an operation</a:t>
+            </a:r>
+          </a:p>
+          <a:p>
+            <a:pPr marL="285750" indent="-285750">
+              <a:buFont typeface="Arial" panose="020B0604020202020204" pitchFamily="34" charset="0"/>
+              <a:buChar char="•"/>
+            </a:pPr>
             <a:endParaRPr lang="en-US" dirty="0"/>
           </a:p>
-          <a:p>
-            <a:pPr marL="0" lvl="1" indent="0">
-              <a:buNone/>
-            </a:pPr>
-            <a:r>
-              <a:rPr lang="en-US" dirty="0" smtClean="0"/>
-              <a:t>C Libraries  for Developers are NOT header based</a:t>
-            </a:r>
-          </a:p>
-          <a:p>
-            <a:pPr lvl="1"/>
-            <a:r>
-              <a:rPr lang="en-US" dirty="0" smtClean="0"/>
-              <a:t>MS09-035</a:t>
-            </a:r>
-          </a:p>
-          <a:p>
-            <a:pPr lvl="1"/>
-            <a:r>
-              <a:rPr lang="en-US" dirty="0"/>
-              <a:t>Active Template Library Security Update for Developers</a:t>
-            </a:r>
-          </a:p>
-          <a:p>
-            <a:pPr lvl="1"/>
-            <a:r>
-              <a:rPr lang="en-US" dirty="0"/>
-              <a:t>Attention Customers!!!!</a:t>
-            </a:r>
-          </a:p>
-          <a:p>
-            <a:pPr lvl="1"/>
-            <a:endParaRPr lang="en-US" dirty="0"/>
-          </a:p>
-        </p:txBody>
-      </p:sp>
-      <p:sp>
-        <p:nvSpPr>
-          <p:cNvPr id="2" name="Title 1"/>
+        </p:txBody>
+      </p:sp>
+      <p:sp>
+        <p:nvSpPr>
+          <p:cNvPr id="3" name="Title 2"/>
           <p:cNvSpPr>
             <a:spLocks noGrp="1"/>
           </p:cNvSpPr>
@@ -5080,7 +5024,7 @@
           <a:p>
             <a:r>
               <a:rPr lang="en-US" dirty="0" smtClean="0"/>
-              <a:t>(continued.)</a:t>
+              <a:t>The Spirit of C (X3J11 C89)</a:t>
             </a:r>
             <a:endParaRPr lang="en-US" dirty="0"/>
           </a:p>
@@ -5089,7 +5033,7 @@
     </p:spTree>
     <p:extLst>
       <p:ext uri="{BB962C8B-B14F-4D97-AF65-F5344CB8AC3E}">
-        <p14:creationId xmlns:p14="http://schemas.microsoft.com/office/powerpoint/2010/main" val="3273235548"/>
+        <p14:creationId xmlns:p14="http://schemas.microsoft.com/office/powerpoint/2010/main" val="3415404781"/>
       </p:ext>
     </p:extLst>
   </p:cSld>
@@ -5128,7 +5072,9 @@
         </p:nvSpPr>
         <p:spPr/>
         <p:txBody>
-          <a:bodyPr/>
+          <a:bodyPr>
+            <a:normAutofit/>
+          </a:bodyPr>
           <a:lstStyle/>
           <a:p>
             <a:pPr marL="285750" indent="-285750">
@@ -5137,7 +5083,69 @@
             </a:pPr>
             <a:r>
               <a:rPr lang="en-US" dirty="0" smtClean="0"/>
-              <a:t>TRUST THE PROGRAMMER.</a:t>
+              <a:t>The programmer is NOT to be trusted</a:t>
+            </a:r>
+          </a:p>
+          <a:p>
+            <a:pPr marL="457200" lvl="1" indent="-285750"/>
+            <a:r>
+              <a:rPr lang="en-US" dirty="0" smtClean="0"/>
+              <a:t>Don’t use pointers, use </a:t>
+            </a:r>
+            <a:r>
+              <a:rPr lang="en-US" dirty="0" err="1" smtClean="0"/>
+              <a:t>unique_ptr</a:t>
+            </a:r>
+            <a:r>
+              <a:rPr lang="en-US" dirty="0" smtClean="0"/>
+              <a:t> or </a:t>
+            </a:r>
+            <a:r>
+              <a:rPr lang="en-US" dirty="0" err="1" smtClean="0"/>
+              <a:t>shared_ptr</a:t>
+            </a:r>
+            <a:endParaRPr lang="en-US" dirty="0" smtClean="0"/>
+          </a:p>
+          <a:p>
+            <a:pPr marL="457200" lvl="1" indent="-285750"/>
+            <a:r>
+              <a:rPr lang="en-US" dirty="0" smtClean="0"/>
+              <a:t>Don’t’ use </a:t>
+            </a:r>
+            <a:r>
+              <a:rPr lang="en-US" dirty="0" err="1" smtClean="0"/>
+              <a:t>const</a:t>
+            </a:r>
+            <a:r>
+              <a:rPr lang="en-US" dirty="0" smtClean="0"/>
+              <a:t> char *, use strings</a:t>
+            </a:r>
+          </a:p>
+          <a:p>
+            <a:pPr marL="457200" lvl="1" indent="-285750"/>
+            <a:r>
+              <a:rPr lang="en-US" dirty="0" smtClean="0"/>
+              <a:t>Don’t use </a:t>
+            </a:r>
+            <a:r>
+              <a:rPr lang="en-US" dirty="0" err="1" smtClean="0"/>
+              <a:t>stdio.h</a:t>
+            </a:r>
+            <a:r>
+              <a:rPr lang="en-US" dirty="0" smtClean="0"/>
+              <a:t>, use </a:t>
+            </a:r>
+            <a:r>
+              <a:rPr lang="en-US" dirty="0" err="1" smtClean="0"/>
+              <a:t>iostream</a:t>
+            </a:r>
+            <a:endParaRPr lang="en-US" dirty="0" smtClean="0"/>
+          </a:p>
+          <a:p>
+            <a:pPr marL="285750" indent="-285750"/>
+            <a:r>
+              <a:rPr lang="en-US" dirty="0" smtClean="0"/>
+              <a:t>Make the language large and complex, constantly churning.</a:t>
             </a:r>
           </a:p>
           <a:p>
@@ -5147,7 +5155,7 @@
             </a:pPr>
             <a:r>
               <a:rPr lang="en-US" dirty="0" smtClean="0"/>
-              <a:t>Don’t prevent the programmer from doing what needs to be done.</a:t>
+              <a:t>Library doubled in size 2008 TR1</a:t>
             </a:r>
           </a:p>
           <a:p>
@@ -5157,7 +5165,14 @@
             </a:pPr>
             <a:r>
               <a:rPr lang="en-US" dirty="0" smtClean="0"/>
-              <a:t>KEEP THE LANGUAGE SMALL AND SIMPLE</a:t>
+              <a:t>Suffers from terminal feature creep</a:t>
+            </a:r>
+          </a:p>
+          <a:p>
+            <a:pPr marL="457200" lvl="1" indent="-285750"/>
+            <a:r>
+              <a:rPr lang="en-US" dirty="0" smtClean="0"/>
+              <a:t>Ignore data, the code will simplify your problem.</a:t>
             </a:r>
           </a:p>
           <a:p>
@@ -5167,8 +5182,42 @@
             </a:pPr>
             <a:r>
               <a:rPr lang="en-US" dirty="0" smtClean="0"/>
-              <a:t>Provide only one way to do an operation</a:t>
-            </a:r>
+              <a:t>The compiler will do it for you</a:t>
+            </a:r>
+          </a:p>
+          <a:p>
+            <a:pPr marL="457200" lvl="1" indent="-285750"/>
+            <a:r>
+              <a:rPr lang="en-US" dirty="0" smtClean="0"/>
+              <a:t>Don’t try to help the compiler</a:t>
+            </a:r>
+          </a:p>
+          <a:p>
+            <a:pPr marL="285750" indent="-285750">
+              <a:buFont typeface="Arial" panose="020B0604020202020204" pitchFamily="34" charset="0"/>
+              <a:buChar char="•"/>
+            </a:pPr>
+            <a:r>
+              <a:rPr lang="en-US" dirty="0" smtClean="0"/>
+              <a:t>Don’t engineer your own data structures and algorithms</a:t>
+            </a:r>
+          </a:p>
+          <a:p>
+            <a:pPr marL="457200" lvl="1" indent="-285750"/>
+            <a:r>
+              <a:rPr lang="en-US" dirty="0" smtClean="0"/>
+              <a:t>Use our library</a:t>
+            </a:r>
+          </a:p>
+          <a:p>
+            <a:pPr marL="285750" indent="-285750"/>
+            <a:endParaRPr lang="en-US" dirty="0" smtClean="0"/>
+          </a:p>
+          <a:p>
+            <a:pPr lvl="1" indent="0">
+              <a:buNone/>
+            </a:pPr>
+            <a:endParaRPr lang="en-US" dirty="0" smtClean="0"/>
           </a:p>
           <a:p>
             <a:pPr marL="285750" indent="-285750">
@@ -5196,7 +5245,7 @@
           <a:p>
             <a:r>
               <a:rPr lang="en-US" dirty="0" smtClean="0"/>
-              <a:t>The Spirit of C (X3J11 C89)</a:t>
+              <a:t>The Spirit of C++?</a:t>
             </a:r>
             <a:endParaRPr lang="en-US" dirty="0"/>
           </a:p>
@@ -5205,7 +5254,7 @@
     </p:spTree>
     <p:extLst>
       <p:ext uri="{BB962C8B-B14F-4D97-AF65-F5344CB8AC3E}">
-        <p14:creationId xmlns:p14="http://schemas.microsoft.com/office/powerpoint/2010/main" val="3415404781"/>
+        <p14:creationId xmlns:p14="http://schemas.microsoft.com/office/powerpoint/2010/main" val="3406075973"/>
       </p:ext>
     </p:extLst>
   </p:cSld>
@@ -5244,158 +5293,29 @@
         </p:nvSpPr>
         <p:spPr/>
         <p:txBody>
-          <a:bodyPr>
-            <a:normAutofit/>
-          </a:bodyPr>
-          <a:lstStyle/>
-          <a:p>
-            <a:pPr marL="285750" indent="-285750">
-              <a:buFont typeface="Arial" panose="020B0604020202020204" pitchFamily="34" charset="0"/>
-              <a:buChar char="•"/>
-            </a:pPr>
-            <a:r>
-              <a:rPr lang="en-US" dirty="0" smtClean="0"/>
-              <a:t>The programmer is NOT to be trusted</a:t>
-            </a:r>
-          </a:p>
-          <a:p>
-            <a:pPr marL="457200" lvl="1" indent="-285750"/>
-            <a:r>
-              <a:rPr lang="en-US" dirty="0" smtClean="0"/>
-              <a:t>Don’t use pointers, use </a:t>
-            </a:r>
-            <a:r>
-              <a:rPr lang="en-US" dirty="0" err="1" smtClean="0"/>
-              <a:t>unique_ptr</a:t>
-            </a:r>
-            <a:r>
-              <a:rPr lang="en-US" dirty="0" smtClean="0"/>
-              <a:t> or </a:t>
-            </a:r>
-            <a:r>
-              <a:rPr lang="en-US" dirty="0" err="1" smtClean="0"/>
-              <a:t>shared_ptr</a:t>
-            </a:r>
-            <a:endParaRPr lang="en-US" dirty="0" smtClean="0"/>
-          </a:p>
-          <a:p>
-            <a:pPr marL="457200" lvl="1" indent="-285750"/>
-            <a:r>
-              <a:rPr lang="en-US" dirty="0" smtClean="0"/>
-              <a:t>Don’t’ use </a:t>
-            </a:r>
-            <a:r>
-              <a:rPr lang="en-US" dirty="0" err="1" smtClean="0"/>
-              <a:t>const</a:t>
-            </a:r>
-            <a:r>
-              <a:rPr lang="en-US" dirty="0" smtClean="0"/>
-              <a:t> char *, use strings</a:t>
-            </a:r>
-          </a:p>
-          <a:p>
-            <a:pPr marL="457200" lvl="1" indent="-285750"/>
-            <a:r>
-              <a:rPr lang="en-US" dirty="0" smtClean="0"/>
-              <a:t>Don’t use </a:t>
-            </a:r>
-            <a:r>
-              <a:rPr lang="en-US" dirty="0" err="1" smtClean="0"/>
-              <a:t>stdio.h</a:t>
-            </a:r>
-            <a:r>
-              <a:rPr lang="en-US" dirty="0" smtClean="0"/>
-              <a:t>, use </a:t>
-            </a:r>
-            <a:r>
-              <a:rPr lang="en-US" dirty="0" err="1" smtClean="0"/>
-              <a:t>iostream</a:t>
-            </a:r>
-            <a:endParaRPr lang="en-US" dirty="0" smtClean="0"/>
-          </a:p>
-          <a:p>
-            <a:pPr marL="285750" indent="-285750"/>
-            <a:r>
-              <a:rPr lang="en-US" dirty="0" smtClean="0"/>
-              <a:t>Make the language large and complex, constantly churning.</a:t>
-            </a:r>
-          </a:p>
-          <a:p>
-            <a:pPr marL="285750" indent="-285750">
-              <a:buFont typeface="Arial" panose="020B0604020202020204" pitchFamily="34" charset="0"/>
-              <a:buChar char="•"/>
-            </a:pPr>
-            <a:r>
-              <a:rPr lang="en-US" dirty="0" smtClean="0"/>
-              <a:t>Library doubled in size 2008 TR1</a:t>
-            </a:r>
-          </a:p>
-          <a:p>
-            <a:pPr marL="285750" indent="-285750">
-              <a:buFont typeface="Arial" panose="020B0604020202020204" pitchFamily="34" charset="0"/>
-              <a:buChar char="•"/>
-            </a:pPr>
-            <a:r>
-              <a:rPr lang="en-US" dirty="0" smtClean="0"/>
-              <a:t>Suffers from terminal feature creep</a:t>
-            </a:r>
-          </a:p>
-          <a:p>
-            <a:pPr marL="457200" lvl="1" indent="-285750"/>
-            <a:r>
-              <a:rPr lang="en-US" dirty="0" smtClean="0"/>
-              <a:t>Ignore data, the code will simplify your problem.</a:t>
-            </a:r>
-          </a:p>
-          <a:p>
-            <a:pPr marL="285750" indent="-285750">
-              <a:buFont typeface="Arial" panose="020B0604020202020204" pitchFamily="34" charset="0"/>
-              <a:buChar char="•"/>
-            </a:pPr>
-            <a:r>
-              <a:rPr lang="en-US" dirty="0" smtClean="0"/>
-              <a:t>The compiler will do it for you</a:t>
-            </a:r>
-          </a:p>
-          <a:p>
-            <a:pPr marL="457200" lvl="1" indent="-285750"/>
-            <a:r>
-              <a:rPr lang="en-US" dirty="0" smtClean="0"/>
-              <a:t>Don’t try to help the compiler</a:t>
-            </a:r>
-          </a:p>
-          <a:p>
-            <a:pPr marL="285750" indent="-285750">
-              <a:buFont typeface="Arial" panose="020B0604020202020204" pitchFamily="34" charset="0"/>
-              <a:buChar char="•"/>
-            </a:pPr>
-            <a:r>
-              <a:rPr lang="en-US" dirty="0" smtClean="0"/>
-              <a:t>Don’t engineer your own data structures and algorithms</a:t>
-            </a:r>
-          </a:p>
-          <a:p>
-            <a:pPr marL="457200" lvl="1" indent="-285750"/>
-            <a:r>
-              <a:rPr lang="en-US" dirty="0" smtClean="0"/>
-              <a:t>Use our library</a:t>
-            </a:r>
-          </a:p>
-          <a:p>
-            <a:pPr marL="285750" indent="-285750"/>
-            <a:endParaRPr lang="en-US" dirty="0" smtClean="0"/>
-          </a:p>
-          <a:p>
-            <a:pPr lvl="1" indent="0">
-              <a:buNone/>
-            </a:pPr>
-            <a:endParaRPr lang="en-US" dirty="0" smtClean="0"/>
-          </a:p>
-          <a:p>
-            <a:pPr marL="285750" indent="-285750">
-              <a:buFont typeface="Arial" panose="020B0604020202020204" pitchFamily="34" charset="0"/>
-              <a:buChar char="•"/>
-            </a:pPr>
+          <a:bodyPr/>
+          <a:lstStyle/>
+          <a:p>
+            <a:r>
+              <a:rPr lang="en-US" dirty="0" smtClean="0"/>
+              <a:t>C:  Respects and empowers you.</a:t>
+            </a:r>
+          </a:p>
+          <a:p>
+            <a:r>
+              <a:rPr lang="en-US" dirty="0"/>
+              <a:t>C++:  </a:t>
+            </a:r>
+            <a:r>
+              <a:rPr lang="en-US" dirty="0" smtClean="0"/>
+              <a:t>Suspects you.  You need to be constantly suckled, remaining tied to the hip with the new features, rebuild to the new ABIs</a:t>
+            </a:r>
+          </a:p>
+          <a:p>
+            <a:r>
+              <a:rPr lang="en-US" dirty="0" smtClean="0"/>
+              <a:t>In other words, never weaned off the teat of Mother Committee. </a:t>
+            </a:r>
             <a:endParaRPr lang="en-US" dirty="0"/>
           </a:p>
         </p:txBody>
@@ -5417,7 +5337,7 @@
           <a:p>
             <a:r>
               <a:rPr lang="en-US" dirty="0" smtClean="0"/>
-              <a:t>The Spirit of C++?</a:t>
+              <a:t>C Respects ; C++ Suspects</a:t>
             </a:r>
             <a:endParaRPr lang="en-US" dirty="0"/>
           </a:p>
@@ -5426,7 +5346,7 @@
     </p:spTree>
     <p:extLst>
       <p:ext uri="{BB962C8B-B14F-4D97-AF65-F5344CB8AC3E}">
-        <p14:creationId xmlns:p14="http://schemas.microsoft.com/office/powerpoint/2010/main" val="3406075973"/>
+        <p14:creationId xmlns:p14="http://schemas.microsoft.com/office/powerpoint/2010/main" val="457142465"/>
       </p:ext>
     </p:extLst>
   </p:cSld>
@@ -5470,26 +5390,109 @@
           <a:p>
             <a:r>
               <a:rPr lang="en-US" dirty="0" smtClean="0"/>
-              <a:t>C:  Respects and empowers you.</a:t>
-            </a:r>
-          </a:p>
-          <a:p>
+              <a:t>Small Tests: Sorting 1M random integers. (inline code faster but larger)</a:t>
+            </a:r>
+          </a:p>
+          <a:p>
+            <a:r>
+              <a:rPr lang="en-US" dirty="0" smtClean="0"/>
+              <a:t>Larger Sample: 350-500 Lines: Create Index to Footnotes</a:t>
+            </a:r>
+          </a:p>
+          <a:p>
+            <a:r>
+              <a:rPr lang="en-US" dirty="0" smtClean="0"/>
+              <a:t>C (clang 7 built for speed: O3):</a:t>
+            </a:r>
+          </a:p>
+          <a:p>
+            <a:pPr marL="285750" indent="-285750">
+              <a:buFont typeface="Arial" panose="020B0604020202020204" pitchFamily="34" charset="0"/>
+              <a:buChar char="•"/>
+            </a:pPr>
+            <a:r>
+              <a:rPr lang="en-US" dirty="0" smtClean="0"/>
+              <a:t>Lines to implement: 510</a:t>
+            </a:r>
+          </a:p>
+          <a:p>
+            <a:pPr marL="285750" indent="-285750">
+              <a:buFont typeface="Arial" panose="020B0604020202020204" pitchFamily="34" charset="0"/>
+              <a:buChar char="•"/>
+            </a:pPr>
+            <a:r>
+              <a:rPr lang="en-US" dirty="0" smtClean="0"/>
+              <a:t>Size: 18032</a:t>
+            </a:r>
+          </a:p>
+          <a:p>
+            <a:pPr marL="285750" indent="-285750">
+              <a:buFont typeface="Arial" panose="020B0604020202020204" pitchFamily="34" charset="0"/>
+              <a:buChar char="•"/>
+            </a:pPr>
+            <a:r>
+              <a:rPr lang="en-US" dirty="0" smtClean="0"/>
+              <a:t>Perf (clock ticks / CLOCKS_PER_SEC): 0.0053</a:t>
+            </a:r>
+          </a:p>
+          <a:p>
+            <a:r>
+              <a:rPr lang="en-US" dirty="0" smtClean="0"/>
+              <a:t>C++ (clang++ 7 built for speed O3)</a:t>
+            </a:r>
+          </a:p>
+          <a:p>
+            <a:pPr marL="285750" indent="-285750">
+              <a:buFont typeface="Arial" panose="020B0604020202020204" pitchFamily="34" charset="0"/>
+              <a:buChar char="•"/>
+            </a:pPr>
             <a:r>
               <a:rPr lang="en-US" dirty="0"/>
-              <a:t>C++:  </a:t>
-            </a:r>
-            <a:r>
-              <a:rPr lang="en-US" dirty="0" smtClean="0"/>
-              <a:t>Suspects you.  You need to be constantly suckled, remaining tied to the hip with the new features, rebuild to the new ABIs</a:t>
-            </a:r>
-          </a:p>
-          <a:p>
-            <a:r>
-              <a:rPr lang="en-US" dirty="0" smtClean="0"/>
-              <a:t>In other words, never weaned off the teat of Mother Committee. </a:t>
+              <a:t>Lines to implement: </a:t>
+            </a:r>
+            <a:r>
+              <a:rPr lang="en-US" dirty="0" smtClean="0"/>
+              <a:t>316</a:t>
             </a:r>
             <a:endParaRPr lang="en-US" dirty="0"/>
           </a:p>
+          <a:p>
+            <a:pPr marL="285750" indent="-285750">
+              <a:buFont typeface="Arial" panose="020B0604020202020204" pitchFamily="34" charset="0"/>
+              <a:buChar char="•"/>
+            </a:pPr>
+            <a:r>
+              <a:rPr lang="en-US" dirty="0"/>
+              <a:t>Size: </a:t>
+            </a:r>
+            <a:r>
+              <a:rPr lang="en-US" dirty="0" smtClean="0"/>
+              <a:t>195560 (over 10x larger)</a:t>
+            </a:r>
+            <a:endParaRPr lang="en-US" dirty="0"/>
+          </a:p>
+          <a:p>
+            <a:pPr marL="285750" indent="-285750">
+              <a:buFont typeface="Arial" panose="020B0604020202020204" pitchFamily="34" charset="0"/>
+              <a:buChar char="•"/>
+            </a:pPr>
+            <a:r>
+              <a:rPr lang="en-US" dirty="0"/>
+              <a:t>Perf (clock ticks / CLOCKS_PER_SEC): </a:t>
+            </a:r>
+            <a:r>
+              <a:rPr lang="en-US" dirty="0" smtClean="0"/>
+              <a:t>0.0305 (</a:t>
+            </a:r>
+            <a:r>
+              <a:rPr lang="en-US" smtClean="0"/>
+              <a:t>6x slower)</a:t>
+            </a:r>
+            <a:endParaRPr lang="en-US" dirty="0"/>
+          </a:p>
+          <a:p>
+            <a:endParaRPr lang="en-US" dirty="0"/>
+          </a:p>
         </p:txBody>
       </p:sp>
       <p:sp>
@@ -5509,7 +5512,7 @@
           <a:p>
             <a:r>
               <a:rPr lang="en-US" dirty="0" smtClean="0"/>
-              <a:t>C Respects ; C++ Suspects</a:t>
+              <a:t>Size ,Speed: New Claims Falter</a:t>
             </a:r>
             <a:endParaRPr lang="en-US" dirty="0"/>
           </a:p>
@@ -5518,7 +5521,7 @@
     </p:spTree>
     <p:extLst>
       <p:ext uri="{BB962C8B-B14F-4D97-AF65-F5344CB8AC3E}">
-        <p14:creationId xmlns:p14="http://schemas.microsoft.com/office/powerpoint/2010/main" val="457142465"/>
+        <p14:creationId xmlns:p14="http://schemas.microsoft.com/office/powerpoint/2010/main" val="1291508639"/>
       </p:ext>
     </p:extLst>
   </p:cSld>
@@ -5547,7 +5550,7 @@
       </p:grpSpPr>
       <p:sp>
         <p:nvSpPr>
-          <p:cNvPr id="3" name="Content Placeholder 2"/>
+          <p:cNvPr id="2" name="Content Placeholder 1"/>
           <p:cNvSpPr>
             <a:spLocks noGrp="1"/>
           </p:cNvSpPr>
@@ -5562,116 +5565,73 @@
           <a:p>
             <a:r>
               <a:rPr lang="en-US" dirty="0" smtClean="0"/>
-              <a:t>Minimal Tools, no IDE</a:t>
-            </a:r>
-          </a:p>
-          <a:p>
-            <a:pPr lvl="1"/>
-            <a:r>
-              <a:rPr lang="en-US" dirty="0" err="1" smtClean="0"/>
-              <a:t>Stlink</a:t>
-            </a:r>
-            <a:r>
-              <a:rPr lang="en-US" dirty="0" smtClean="0"/>
-              <a:t> </a:t>
-            </a:r>
-            <a:r>
-              <a:rPr lang="en-US" dirty="0" err="1" smtClean="0"/>
-              <a:t>usb</a:t>
-            </a:r>
-            <a:r>
-              <a:rPr lang="en-US" dirty="0" smtClean="0"/>
-              <a:t> driver, </a:t>
-            </a:r>
-            <a:r>
-              <a:rPr lang="en-US" dirty="0" err="1" smtClean="0"/>
-              <a:t>gdbserver</a:t>
-            </a:r>
-            <a:r>
-              <a:rPr lang="en-US" dirty="0" smtClean="0"/>
-              <a:t> deployment</a:t>
-            </a:r>
-          </a:p>
-          <a:p>
-            <a:pPr lvl="1"/>
-            <a:r>
-              <a:rPr lang="en-US" dirty="0" err="1" smtClean="0"/>
-              <a:t>gcc</a:t>
-            </a:r>
-            <a:r>
-              <a:rPr lang="en-US" dirty="0" smtClean="0"/>
-              <a:t> ARM cross tools</a:t>
-            </a:r>
-          </a:p>
-          <a:p>
-            <a:pPr lvl="1"/>
-            <a:r>
-              <a:rPr lang="en-US" dirty="0" err="1" smtClean="0"/>
-              <a:t>Gdb</a:t>
-            </a:r>
-            <a:r>
-              <a:rPr lang="en-US" dirty="0" smtClean="0"/>
-              <a:t> debugging on the host</a:t>
-            </a:r>
-          </a:p>
-          <a:p>
-            <a:pPr lvl="1"/>
-            <a:r>
-              <a:rPr lang="en-US" dirty="0" err="1" smtClean="0"/>
-              <a:t>Semihosting</a:t>
-            </a:r>
-            <a:r>
-              <a:rPr lang="en-US" dirty="0" smtClean="0"/>
-              <a:t> back to the host (printing to screen)</a:t>
-            </a:r>
-          </a:p>
-          <a:p>
-            <a:r>
-              <a:rPr lang="en-US" dirty="0" err="1" smtClean="0"/>
-              <a:t>MLibs</a:t>
-            </a:r>
-            <a:endParaRPr lang="en-US" dirty="0" smtClean="0"/>
-          </a:p>
-          <a:p>
-            <a:pPr lvl="1"/>
-            <a:r>
-              <a:rPr lang="en-US" dirty="0" smtClean="0"/>
-              <a:t>C and C++ Libraries, Tests, and Framework</a:t>
-            </a:r>
-          </a:p>
-          <a:p>
-            <a:pPr lvl="1"/>
-            <a:r>
-              <a:rPr lang="en-US" dirty="0" smtClean="0"/>
-              <a:t>Under GPL2</a:t>
-            </a:r>
-          </a:p>
-          <a:p>
-            <a:r>
-              <a:rPr lang="en-US" dirty="0" smtClean="0"/>
-              <a:t>OK from text only console </a:t>
-            </a:r>
-          </a:p>
-          <a:p>
-            <a:pPr lvl="1"/>
-            <a:r>
-              <a:rPr lang="en-US" dirty="0" smtClean="0"/>
-              <a:t>To debug one test you need </a:t>
-            </a:r>
-            <a:r>
-              <a:rPr lang="en-US" dirty="0" err="1" smtClean="0"/>
-              <a:t>tmux</a:t>
-            </a:r>
-            <a:r>
-              <a:rPr lang="en-US" dirty="0" smtClean="0"/>
-              <a:t> or screen</a:t>
-            </a:r>
-          </a:p>
-        </p:txBody>
-      </p:sp>
-      <p:sp>
-        <p:nvSpPr>
-          <p:cNvPr id="2" name="Title 1"/>
+              <a:t>Header based Libraries:</a:t>
+            </a:r>
+          </a:p>
+          <a:p>
+            <a:pPr marL="285750" indent="-285750">
+              <a:buFont typeface="Arial" panose="020B0604020202020204" pitchFamily="34" charset="0"/>
+              <a:buChar char="•"/>
+            </a:pPr>
+            <a:r>
+              <a:rPr lang="en-US" dirty="0" smtClean="0"/>
+              <a:t> get compiled into your binary</a:t>
+            </a:r>
+          </a:p>
+          <a:p>
+            <a:pPr marL="285750" indent="-285750">
+              <a:buFont typeface="Arial" panose="020B0604020202020204" pitchFamily="34" charset="0"/>
+              <a:buChar char="•"/>
+            </a:pPr>
+            <a:r>
+              <a:rPr lang="en-US" dirty="0" smtClean="0"/>
+              <a:t>Cannot be serviced like a shared library</a:t>
+            </a:r>
+          </a:p>
+          <a:p>
+            <a:r>
+              <a:rPr lang="en-US" dirty="0" smtClean="0"/>
+              <a:t>Can header based libraries be trusted?</a:t>
+            </a:r>
+          </a:p>
+          <a:p>
+            <a:r>
+              <a:rPr lang="en-US" dirty="0" smtClean="0"/>
+              <a:t>Do they run industry standard conformance tests?</a:t>
+            </a:r>
+          </a:p>
+          <a:p>
+            <a:pPr marL="285750" indent="-285750">
+              <a:buFont typeface="Arial" panose="020B0604020202020204" pitchFamily="34" charset="0"/>
+              <a:buChar char="•"/>
+            </a:pPr>
+            <a:r>
+              <a:rPr lang="en-US" dirty="0" smtClean="0"/>
+              <a:t>What are the pass rates?</a:t>
+            </a:r>
+          </a:p>
+          <a:p>
+            <a:pPr marL="285750" indent="-285750">
+              <a:buFont typeface="Arial" panose="020B0604020202020204" pitchFamily="34" charset="0"/>
+              <a:buChar char="•"/>
+            </a:pPr>
+            <a:r>
+              <a:rPr lang="en-US" dirty="0" smtClean="0"/>
+              <a:t>How many are disabled?</a:t>
+            </a:r>
+          </a:p>
+          <a:p>
+            <a:pPr marL="285750" indent="-285750">
+              <a:buFont typeface="Arial" panose="020B0604020202020204" pitchFamily="34" charset="0"/>
+              <a:buChar char="•"/>
+            </a:pPr>
+            <a:endParaRPr lang="en-US" dirty="0"/>
+          </a:p>
+        </p:txBody>
+      </p:sp>
+      <p:sp>
+        <p:nvSpPr>
+          <p:cNvPr id="3" name="Title 2"/>
           <p:cNvSpPr>
             <a:spLocks noGrp="1"/>
           </p:cNvSpPr>
@@ -5681,14 +5641,12 @@
         </p:nvSpPr>
         <p:spPr/>
         <p:txBody>
-          <a:bodyPr>
-            <a:normAutofit/>
-          </a:bodyPr>
-          <a:lstStyle/>
-          <a:p>
-            <a:r>
-              <a:rPr lang="en-US" dirty="0" smtClean="0"/>
-              <a:t>The Language of Microcontrollers</a:t>
+          <a:bodyPr/>
+          <a:lstStyle/>
+          <a:p>
+            <a:r>
+              <a:rPr lang="en-US" dirty="0" smtClean="0"/>
+              <a:t>Serviceability</a:t>
             </a:r>
             <a:endParaRPr lang="en-US" dirty="0"/>
           </a:p>
@@ -5697,7 +5655,7 @@
     </p:spTree>
     <p:extLst>
       <p:ext uri="{BB962C8B-B14F-4D97-AF65-F5344CB8AC3E}">
-        <p14:creationId xmlns:p14="http://schemas.microsoft.com/office/powerpoint/2010/main" val="2731294400"/>
+        <p14:creationId xmlns:p14="http://schemas.microsoft.com/office/powerpoint/2010/main" val="417623703"/>
       </p:ext>
     </p:extLst>
   </p:cSld>
@@ -5740,140 +5698,6 @@
           <a:lstStyle/>
           <a:p>
             <a:r>
-              <a:rPr lang="en-US" dirty="0" smtClean="0"/>
-              <a:t>Header based Libraries:</a:t>
-            </a:r>
-          </a:p>
-          <a:p>
-            <a:pPr marL="285750" indent="-285750">
-              <a:buFont typeface="Arial" panose="020B0604020202020204" pitchFamily="34" charset="0"/>
-              <a:buChar char="•"/>
-            </a:pPr>
-            <a:r>
-              <a:rPr lang="en-US" dirty="0" smtClean="0"/>
-              <a:t> get compiled into your binary</a:t>
-            </a:r>
-          </a:p>
-          <a:p>
-            <a:pPr marL="285750" indent="-285750">
-              <a:buFont typeface="Arial" panose="020B0604020202020204" pitchFamily="34" charset="0"/>
-              <a:buChar char="•"/>
-            </a:pPr>
-            <a:r>
-              <a:rPr lang="en-US" dirty="0" smtClean="0"/>
-              <a:t>Cannot be serviced like a shared library</a:t>
-            </a:r>
-          </a:p>
-          <a:p>
-            <a:r>
-              <a:rPr lang="en-US" dirty="0" smtClean="0"/>
-              <a:t>Can header based libraries be trusted?</a:t>
-            </a:r>
-          </a:p>
-          <a:p>
-            <a:r>
-              <a:rPr lang="en-US" dirty="0" smtClean="0"/>
-              <a:t>Do they run industry standard conformance tests?</a:t>
-            </a:r>
-          </a:p>
-          <a:p>
-            <a:pPr marL="285750" indent="-285750">
-              <a:buFont typeface="Arial" panose="020B0604020202020204" pitchFamily="34" charset="0"/>
-              <a:buChar char="•"/>
-            </a:pPr>
-            <a:r>
-              <a:rPr lang="en-US" dirty="0" smtClean="0"/>
-              <a:t>What are the pass rates?</a:t>
-            </a:r>
-          </a:p>
-          <a:p>
-            <a:pPr marL="285750" indent="-285750">
-              <a:buFont typeface="Arial" panose="020B0604020202020204" pitchFamily="34" charset="0"/>
-              <a:buChar char="•"/>
-            </a:pPr>
-            <a:r>
-              <a:rPr lang="en-US" dirty="0" smtClean="0"/>
-              <a:t>How many are disabled?</a:t>
-            </a:r>
-          </a:p>
-          <a:p>
-            <a:pPr marL="285750" indent="-285750">
-              <a:buFont typeface="Arial" panose="020B0604020202020204" pitchFamily="34" charset="0"/>
-              <a:buChar char="•"/>
-            </a:pPr>
-            <a:endParaRPr lang="en-US" dirty="0"/>
-          </a:p>
-        </p:txBody>
-      </p:sp>
-      <p:sp>
-        <p:nvSpPr>
-          <p:cNvPr id="3" name="Title 2"/>
-          <p:cNvSpPr>
-            <a:spLocks noGrp="1"/>
-          </p:cNvSpPr>
-          <p:nvPr>
-            <p:ph type="title"/>
-          </p:nvPr>
-        </p:nvSpPr>
-        <p:spPr/>
-        <p:txBody>
-          <a:bodyPr/>
-          <a:lstStyle/>
-          <a:p>
-            <a:r>
-              <a:rPr lang="en-US" dirty="0" smtClean="0"/>
-              <a:t>Serviceability</a:t>
-            </a:r>
-            <a:endParaRPr lang="en-US" dirty="0"/>
-          </a:p>
-        </p:txBody>
-      </p:sp>
-    </p:spTree>
-    <p:extLst>
-      <p:ext uri="{BB962C8B-B14F-4D97-AF65-F5344CB8AC3E}">
-        <p14:creationId xmlns:p14="http://schemas.microsoft.com/office/powerpoint/2010/main" val="417623703"/>
-      </p:ext>
-    </p:extLst>
-  </p:cSld>
-  <p:clrMapOvr>
-    <a:masterClrMapping/>
-  </p:clrMapOvr>
-</p:sld>
-</file>
-
-<file path=ppt/slides/slide16.xml><?xml version="1.0" encoding="utf-8"?>
-<p:sld xmlns:a="http://schemas.openxmlformats.org/drawingml/2006/main" xmlns:r="http://schemas.openxmlformats.org/officeDocument/2006/relationships" xmlns:p="http://schemas.openxmlformats.org/presentationml/2006/main">
-  <p:cSld>
-    <p:spTree>
-      <p:nvGrpSpPr>
-        <p:cNvPr id="1" name=""/>
-        <p:cNvGrpSpPr/>
-        <p:nvPr/>
-      </p:nvGrpSpPr>
-      <p:grpSpPr>
-        <a:xfrm>
-          <a:off x="0" y="0"/>
-          <a:ext cx="0" cy="0"/>
-          <a:chOff x="0" y="0"/>
-          <a:chExt cx="0" cy="0"/>
-        </a:xfrm>
-      </p:grpSpPr>
-      <p:sp>
-        <p:nvSpPr>
-          <p:cNvPr id="2" name="Content Placeholder 1"/>
-          <p:cNvSpPr>
-            <a:spLocks noGrp="1"/>
-          </p:cNvSpPr>
-          <p:nvPr>
-            <p:ph sz="quarter" idx="13"/>
-          </p:nvPr>
-        </p:nvSpPr>
-        <p:spPr/>
-        <p:txBody>
-          <a:bodyPr/>
-          <a:lstStyle/>
-          <a:p>
-            <a:r>
               <a:rPr lang="en-US" dirty="0"/>
               <a:t>ATL Security Bug: </a:t>
             </a:r>
@@ -5965,7 +5789,7 @@
 </p:sld>
 </file>
 
-<file path=ppt/slides/slide17.xml><?xml version="1.0" encoding="utf-8"?>
+<file path=ppt/slides/slide16.xml><?xml version="1.0" encoding="utf-8"?>
 <p:sld xmlns:a="http://schemas.openxmlformats.org/drawingml/2006/main" xmlns:r="http://schemas.openxmlformats.org/officeDocument/2006/relationships" xmlns:p="http://schemas.openxmlformats.org/presentationml/2006/main">
   <p:cSld>
     <p:spTree>
@@ -6051,6 +5875,145 @@
 </p:sld>
 </file>
 
+<file path=ppt/slides/slide17.xml><?xml version="1.0" encoding="utf-8"?>
+<p:sld xmlns:a="http://schemas.openxmlformats.org/drawingml/2006/main" xmlns:r="http://schemas.openxmlformats.org/officeDocument/2006/relationships" xmlns:p="http://schemas.openxmlformats.org/presentationml/2006/main">
+  <p:cSld>
+    <p:spTree>
+      <p:nvGrpSpPr>
+        <p:cNvPr id="1" name=""/>
+        <p:cNvGrpSpPr/>
+        <p:nvPr/>
+      </p:nvGrpSpPr>
+      <p:grpSpPr>
+        <a:xfrm>
+          <a:off x="0" y="0"/>
+          <a:ext cx="0" cy="0"/>
+          <a:chOff x="0" y="0"/>
+          <a:chExt cx="0" cy="0"/>
+        </a:xfrm>
+      </p:grpSpPr>
+      <p:sp>
+        <p:nvSpPr>
+          <p:cNvPr id="2" name="Content Placeholder 1"/>
+          <p:cNvSpPr>
+            <a:spLocks noGrp="1"/>
+          </p:cNvSpPr>
+          <p:nvPr>
+            <p:ph sz="quarter" idx="13"/>
+          </p:nvPr>
+        </p:nvSpPr>
+        <p:spPr/>
+        <p:txBody>
+          <a:bodyPr/>
+          <a:lstStyle/>
+          <a:p>
+            <a:r>
+              <a:rPr lang="en-US" dirty="0" smtClean="0"/>
+              <a:t>RMS</a:t>
+            </a:r>
+          </a:p>
+          <a:p>
+            <a:pPr marL="285750" indent="-285750">
+              <a:buFont typeface="Arial" panose="020B0604020202020204" pitchFamily="34" charset="0"/>
+              <a:buChar char="•"/>
+            </a:pPr>
+            <a:r>
+              <a:rPr lang="en-US" dirty="0"/>
+              <a:t>“C++ is a badly designed and ugly language. It would be a shame to use it in </a:t>
+            </a:r>
+            <a:r>
+              <a:rPr lang="en-US" dirty="0" err="1" smtClean="0"/>
+              <a:t>Emacs</a:t>
+            </a:r>
+            <a:r>
+              <a:rPr lang="en-US" dirty="0" smtClean="0"/>
+              <a:t>.” –posted to </a:t>
+            </a:r>
+            <a:r>
+              <a:rPr lang="en-US" dirty="0" err="1" smtClean="0"/>
+              <a:t>emacs-devel</a:t>
+            </a:r>
+            <a:r>
+              <a:rPr lang="en-US" dirty="0" smtClean="0"/>
+              <a:t> July 2010.</a:t>
+            </a:r>
+          </a:p>
+          <a:p>
+            <a:endParaRPr lang="en-US" dirty="0" smtClean="0"/>
+          </a:p>
+          <a:p>
+            <a:r>
+              <a:rPr lang="en-US" dirty="0" smtClean="0"/>
+              <a:t>Mike Acton, Engine Lead</a:t>
+            </a:r>
+            <a:r>
+              <a:rPr lang="en-US" smtClean="0"/>
+              <a:t>, Insomnia Games @ 2014 CPPCON</a:t>
+            </a:r>
+            <a:endParaRPr lang="en-US" dirty="0"/>
+          </a:p>
+          <a:p>
+            <a:pPr marL="285750" indent="-285750">
+              <a:buFont typeface="Arial" panose="020B0604020202020204" pitchFamily="34" charset="0"/>
+              <a:buChar char="•"/>
+            </a:pPr>
+            <a:r>
+              <a:rPr lang="en-US" dirty="0"/>
+              <a:t>Challenges the C++ “World-View”</a:t>
+            </a:r>
+          </a:p>
+          <a:p>
+            <a:pPr marL="457200" lvl="1" indent="-285750"/>
+            <a:r>
+              <a:rPr lang="en-US" dirty="0"/>
+              <a:t>Challenges Code-centric, design pattern-centric</a:t>
+            </a:r>
+          </a:p>
+          <a:p>
+            <a:pPr marL="457200" lvl="1" indent="-285750"/>
+            <a:r>
+              <a:rPr lang="en-US" dirty="0"/>
+              <a:t>Promotes data driven development for resource constrained environments</a:t>
+            </a:r>
+          </a:p>
+        </p:txBody>
+      </p:sp>
+      <p:sp>
+        <p:nvSpPr>
+          <p:cNvPr id="3" name="Title 2"/>
+          <p:cNvSpPr>
+            <a:spLocks noGrp="1"/>
+          </p:cNvSpPr>
+          <p:nvPr>
+            <p:ph type="title"/>
+          </p:nvPr>
+        </p:nvSpPr>
+        <p:spPr/>
+        <p:txBody>
+          <a:bodyPr/>
+          <a:lstStyle/>
+          <a:p>
+            <a:r>
+              <a:rPr lang="en-US" dirty="0" smtClean="0"/>
+              <a:t>Not All Big Names Agree</a:t>
+            </a:r>
+            <a:endParaRPr lang="en-US" dirty="0"/>
+          </a:p>
+        </p:txBody>
+      </p:sp>
+    </p:spTree>
+    <p:extLst>
+      <p:ext uri="{BB962C8B-B14F-4D97-AF65-F5344CB8AC3E}">
+        <p14:creationId xmlns:p14="http://schemas.microsoft.com/office/powerpoint/2010/main" val="2861548632"/>
+      </p:ext>
+    </p:extLst>
+  </p:cSld>
+  <p:clrMapOvr>
+    <a:masterClrMapping/>
+  </p:clrMapOvr>
+</p:sld>
+</file>
+
 <file path=ppt/slides/slide18.xml><?xml version="1.0" encoding="utf-8"?>
 <p:sld xmlns:a="http://schemas.openxmlformats.org/drawingml/2006/main" xmlns:r="http://schemas.openxmlformats.org/officeDocument/2006/relationships" xmlns:p="http://schemas.openxmlformats.org/presentationml/2006/main">
   <p:cSld>
@@ -6084,72 +6047,34 @@
           <a:lstStyle/>
           <a:p>
             <a:r>
-              <a:rPr lang="en-US" dirty="0" smtClean="0"/>
-              <a:t>RMS</a:t>
-            </a:r>
-          </a:p>
-          <a:p>
-            <a:pPr marL="285750" indent="-285750">
-              <a:buFont typeface="Arial" panose="020B0604020202020204" pitchFamily="34" charset="0"/>
-              <a:buChar char="•"/>
-            </a:pPr>
-            <a:r>
               <a:rPr lang="en-US" dirty="0"/>
-              <a:t>“C++ is a badly designed and ugly language. It would be a shame to use it in </a:t>
-            </a:r>
-            <a:r>
-              <a:rPr lang="en-US" dirty="0" err="1" smtClean="0"/>
-              <a:t>Emacs</a:t>
-            </a:r>
-            <a:r>
-              <a:rPr lang="en-US" dirty="0" smtClean="0"/>
-              <a:t>.” –posted to </a:t>
-            </a:r>
-            <a:r>
-              <a:rPr lang="en-US" dirty="0" err="1" smtClean="0"/>
-              <a:t>emacs-devel</a:t>
-            </a:r>
-            <a:r>
-              <a:rPr lang="en-US" dirty="0" smtClean="0"/>
-              <a:t> July 2010.</a:t>
-            </a:r>
-          </a:p>
-          <a:p>
+              <a:t>*YOU* are full of bullshit. C++ is a horrible language. It's made more horrible by the fact that a lot of substandard programmers use it, to the point where it's much </a:t>
+            </a:r>
+            <a:r>
+              <a:rPr lang="en-US" dirty="0" err="1"/>
+              <a:t>much</a:t>
+            </a:r>
+            <a:r>
+              <a:rPr lang="en-US" dirty="0"/>
+              <a:t> easier to generate total and utter crap with it. Quite frankly, even if the choice of C were to do *nothing* but keep the C++ programmers out, that in itself would be a huge reason to use C. </a:t>
+            </a:r>
+            <a:br>
+              <a:rPr lang="en-US" dirty="0"/>
+            </a:br>
             <a:endParaRPr lang="en-US" dirty="0" smtClean="0"/>
           </a:p>
           <a:p>
             <a:r>
-              <a:rPr lang="en-US" dirty="0" smtClean="0"/>
-              <a:t>Mike Acton, Engine Lead</a:t>
-            </a:r>
-            <a:r>
-              <a:rPr lang="en-US" smtClean="0"/>
-              <a:t>, Insomnia Games @ 2014 CPPCON</a:t>
-            </a:r>
-            <a:endParaRPr lang="en-US" dirty="0"/>
-          </a:p>
-          <a:p>
-            <a:pPr marL="285750" indent="-285750">
-              <a:buFont typeface="Arial" panose="020B0604020202020204" pitchFamily="34" charset="0"/>
-              <a:buChar char="•"/>
-            </a:pPr>
-            <a:r>
               <a:rPr lang="en-US" dirty="0"/>
-              <a:t>Challenges the C++ “World-View”</a:t>
-            </a:r>
-          </a:p>
-          <a:p>
-            <a:pPr marL="457200" lvl="1" indent="-285750"/>
+              <a:t>In other words: the choice of C is the only sane choice. I know Miles Bader jokingly said "to piss you off", but it's actually true. I've come to the conclusion that any programmer that would prefer the project to be in C++ over C is likely a programmer that I really *would* prefer to piss off, so that he doesn't come and screw up any project I'm involved with. C++ leads to really </a:t>
+            </a:r>
+            <a:r>
+              <a:rPr lang="en-US" dirty="0" err="1"/>
+              <a:t>really</a:t>
+            </a:r>
             <a:r>
               <a:rPr lang="en-US" dirty="0"/>
-              <a:t>Challenges Code-centric, design pattern-centric</a:t>
-            </a:r>
-          </a:p>
-          <a:p>
-            <a:pPr marL="457200" lvl="1" indent="-285750"/>
-            <a:r>
-              <a:rPr lang="en-US" dirty="0"/>
-              <a:t>Promotes data driven development for resource constrained environments</a:t>
+              <a:t> bad design choices. You invariably start using the "nice" library features of the language like STL and Boost and other total and utter crap, that may "help" you program, but causes:</a:t>
             </a:r>
           </a:p>
         </p:txBody>
@@ -6171,7 +6096,7 @@
           <a:p>
             <a:r>
               <a:rPr lang="en-US" dirty="0" smtClean="0"/>
-              <a:t>Not All Big Names Agree</a:t>
+              <a:t>Linus on C++</a:t>
             </a:r>
             <a:endParaRPr lang="en-US" dirty="0"/>
           </a:p>
@@ -6180,7 +6105,7 @@
     </p:spTree>
     <p:extLst>
       <p:ext uri="{BB962C8B-B14F-4D97-AF65-F5344CB8AC3E}">
-        <p14:creationId xmlns:p14="http://schemas.microsoft.com/office/powerpoint/2010/main" val="2861548632"/>
+        <p14:creationId xmlns:p14="http://schemas.microsoft.com/office/powerpoint/2010/main" val="59109705"/>
       </p:ext>
     </p:extLst>
   </p:cSld>
@@ -6219,60 +6144,75 @@
         </p:nvSpPr>
         <p:spPr/>
         <p:txBody>
+          <a:bodyPr>
+            <a:normAutofit fontScale="92500" lnSpcReduction="20000"/>
+          </a:bodyPr>
+          <a:lstStyle/>
+          <a:p>
+            <a:pPr marL="285750" indent="-285750">
+              <a:buFontTx/>
+              <a:buChar char="-"/>
+            </a:pPr>
+            <a:r>
+              <a:rPr lang="en-US" dirty="0" smtClean="0"/>
+              <a:t>infinite </a:t>
+            </a:r>
+            <a:r>
+              <a:rPr lang="en-US" dirty="0"/>
+              <a:t>amounts of pain when they don't work (and anybody who tells me that STL and especially Boost are stable and portable is just so full of BS that it's not even funny) </a:t>
+            </a:r>
+            <a:endParaRPr lang="en-US" dirty="0" smtClean="0"/>
+          </a:p>
+          <a:p>
+            <a:pPr marL="285750" indent="-285750">
+              <a:buFontTx/>
+              <a:buChar char="-"/>
+            </a:pPr>
+            <a:r>
+              <a:rPr lang="en-US" dirty="0" smtClean="0"/>
+              <a:t>- </a:t>
+            </a:r>
+            <a:r>
+              <a:rPr lang="en-US" dirty="0"/>
+              <a:t>inefficient abstracted programming models where two years down the road you notice that some abstraction wasn't very efficient, but now all your code depends on all the nice object models around it, and you cannot fix it without rewriting your app. In other words, the only way to do good, efficient, and system-level and portable C++ ends up to limit yourself to all the things that are basically available in C. And limiting your project to C means that people don't screw that up, and also means that you get a lot of programmers that do actually understand low-level issues and don't screw things up with any idiotic "object model" crap. So I'm sorry, but for something like </a:t>
+            </a:r>
+            <a:r>
+              <a:rPr lang="en-US" dirty="0" err="1"/>
+              <a:t>git</a:t>
+            </a:r>
+            <a:r>
+              <a:rPr lang="en-US" dirty="0"/>
+              <a:t>, where efficiency was a primary objective, the "advantages" of C++ is just a huge mistake. The fact that we also piss off people who cannot see that is just a big additional advantage. If you want a VCS that is written in C++, go play with Monotone. Really. They use a "real database". They use "nice object-oriented libraries". They use "nice C++ abstractions". And quite frankly, as a result of all these design decisions that sound so appealing to some CS people, the end result is a horrible and unmaintainable mess. But I'm sure you'd like it more than </a:t>
+            </a:r>
+            <a:r>
+              <a:rPr lang="en-US" dirty="0" err="1"/>
+              <a:t>git</a:t>
+            </a:r>
+            <a:r>
+              <a:rPr lang="en-US" dirty="0"/>
+              <a:t>.</a:t>
+            </a:r>
+          </a:p>
+        </p:txBody>
+      </p:sp>
+      <p:sp>
+        <p:nvSpPr>
+          <p:cNvPr id="3" name="Title 2"/>
+          <p:cNvSpPr>
+            <a:spLocks noGrp="1"/>
+          </p:cNvSpPr>
+          <p:nvPr>
+            <p:ph type="title"/>
+          </p:nvPr>
+        </p:nvSpPr>
+        <p:spPr/>
+        <p:txBody>
           <a:bodyPr/>
           <a:lstStyle/>
           <a:p>
             <a:r>
-              <a:rPr lang="en-US" dirty="0"/>
-              <a:t>*YOU* are full of bullshit. C++ is a horrible language. It's made more horrible by the fact that a lot of substandard programmers use it, to the point where it's much </a:t>
-            </a:r>
-            <a:r>
-              <a:rPr lang="en-US" dirty="0" err="1"/>
-              <a:t>much</a:t>
-            </a:r>
-            <a:r>
-              <a:rPr lang="en-US" dirty="0"/>
-              <a:t> easier to generate total and utter crap with it. Quite frankly, even if the choice of C were to do *nothing* but keep the C++ programmers out, that in itself would be a huge reason to use C. </a:t>
-            </a:r>
-            <a:br>
-              <a:rPr lang="en-US" dirty="0"/>
-            </a:br>
-            <a:endParaRPr lang="en-US" dirty="0" smtClean="0"/>
-          </a:p>
-          <a:p>
-            <a:r>
-              <a:rPr lang="en-US" dirty="0"/>
-              <a:t>In other words: the choice of C is the only sane choice. I know Miles Bader jokingly said "to piss you off", but it's actually true. I've come to the conclusion that any programmer that would prefer the project to be in C++ over C is likely a programmer that I really *would* prefer to piss off, so that he doesn't come and screw up any project I'm involved with. C++ leads to really </a:t>
-            </a:r>
-            <a:r>
-              <a:rPr lang="en-US" dirty="0" err="1"/>
-              <a:t>really</a:t>
-            </a:r>
-            <a:r>
-              <a:rPr lang="en-US" dirty="0"/>
-              <a:t> bad design choices. You invariably start using the "nice" library features of the language like STL and Boost and other total and utter crap, that may "help" you program, but causes:</a:t>
-            </a:r>
-          </a:p>
-        </p:txBody>
-      </p:sp>
-      <p:sp>
-        <p:nvSpPr>
-          <p:cNvPr id="3" name="Title 2"/>
-          <p:cNvSpPr>
-            <a:spLocks noGrp="1"/>
-          </p:cNvSpPr>
-          <p:nvPr>
-            <p:ph type="title"/>
-          </p:nvPr>
-        </p:nvSpPr>
-        <p:spPr/>
-        <p:txBody>
-          <a:bodyPr/>
-          <a:lstStyle/>
-          <a:p>
-            <a:r>
-              <a:rPr lang="en-US" dirty="0" smtClean="0"/>
-              <a:t>Linus on C++</a:t>
+              <a:rPr lang="en-US" dirty="0" smtClean="0"/>
+              <a:t>Linus on C++ Continued</a:t>
             </a:r>
             <a:endParaRPr lang="en-US" dirty="0"/>
           </a:p>
@@ -6281,7 +6221,7 @@
     </p:spTree>
     <p:extLst>
       <p:ext uri="{BB962C8B-B14F-4D97-AF65-F5344CB8AC3E}">
-        <p14:creationId xmlns:p14="http://schemas.microsoft.com/office/powerpoint/2010/main" val="59109705"/>
+        <p14:creationId xmlns:p14="http://schemas.microsoft.com/office/powerpoint/2010/main" val="741281212"/>
       </p:ext>
     </p:extLst>
   </p:cSld>
@@ -6462,54 +6402,71 @@
         </p:nvSpPr>
         <p:spPr/>
         <p:txBody>
-          <a:bodyPr>
-            <a:normAutofit fontScale="92500" lnSpcReduction="20000"/>
-          </a:bodyPr>
-          <a:lstStyle/>
-          <a:p>
-            <a:pPr marL="285750" indent="-285750">
-              <a:buFontTx/>
-              <a:buChar char="-"/>
-            </a:pPr>
-            <a:r>
-              <a:rPr lang="en-US" dirty="0" smtClean="0"/>
-              <a:t>infinite </a:t>
+          <a:bodyPr/>
+          <a:lstStyle/>
+          <a:p>
+            <a:r>
+              <a:rPr lang="en-US" dirty="0" smtClean="0"/>
+              <a:t>“It </a:t>
             </a:r>
             <a:r>
               <a:rPr lang="en-US" dirty="0"/>
-              <a:t>amounts of pain when they don't work (and anybody who tells me that STL and especially Boost are stable and portable is just so full of BS that it's not even funny) </a:t>
-            </a:r>
-            <a:endParaRPr lang="en-US" dirty="0" smtClean="0"/>
-          </a:p>
-          <a:p>
-            <a:pPr marL="285750" indent="-285750">
-              <a:buFontTx/>
-              <a:buChar char="-"/>
-            </a:pPr>
-            <a:r>
-              <a:rPr lang="en-US" dirty="0" smtClean="0"/>
-              <a:t>- </a:t>
+              <a:t>certainly has its good points. But by and large I think it's a bad language. It does a lot of things half well and it's just a garbage heap of ideas that are mutually exclusive. Everybody I know, whether it's personal or corporate, selects a subset and these subsets are different. So it's not a good language to transport an algorithm -- to say, "I wrote it; here, take it." It's way too big, way too complex. And it's obviously built by committee</a:t>
+            </a:r>
+            <a:r>
+              <a:rPr lang="en-US" dirty="0" smtClean="0"/>
+              <a:t>.”</a:t>
+            </a:r>
+          </a:p>
+          <a:p>
+            <a:r>
+              <a:rPr lang="en-US" dirty="0" smtClean="0"/>
+              <a:t>“When </a:t>
+            </a:r>
+            <a:r>
+              <a:rPr lang="en-US" dirty="0" err="1"/>
+              <a:t>Stroustrup</a:t>
             </a:r>
             <a:r>
               <a:rPr lang="en-US" dirty="0"/>
-              <a:t>inefficient abstracted programming models where two years down the road you notice that some abstraction wasn't very efficient, but now all your code depends on all the nice object models around it, and you cannot fix it without rewriting your app. In other words, the only way to do good, efficient, and system-level and portable C++ ends up to limit yourself to all the things that are basically available in C. And limiting your project to C means that people don't screw that up, and also means that you get a lot of programmers that do actually understand low-level issues and don't screw things up with any idiotic "object model" crap. So I'm sorry, but for something like </a:t>
-            </a:r>
-            <a:r>
-              <a:rPr lang="en-US" dirty="0" err="1"/>
-              <a:t>git</a:t>
-            </a:r>
+              <a:t> read the interview he came screaming into my room about how I was undermining him and what I said mattered and I said it was a bad </a:t>
+            </a:r>
+            <a:r>
+              <a:rPr lang="en-US" dirty="0" smtClean="0"/>
+              <a:t>language.”</a:t>
+            </a:r>
+          </a:p>
+          <a:p>
             <a:r>
               <a:rPr lang="en-US" dirty="0"/>
-              <a:t>, where efficiency was a primary objective, the "advantages" of C++ is just a huge mistake. The fact that we also piss off people who cannot see that is just a big additional advantage. If you want a VCS that is written in C++, go play with Monotone. Really. They use a "real database". They use "nice object-oriented libraries". They use "nice C++ abstractions". And quite frankly, as a result of all these design decisions that sound so appealing to some CS people, the end result is a horrible and unmaintainable mess. But I'm sure you'd like it more than </a:t>
-            </a:r>
-            <a:r>
-              <a:rPr lang="en-US" dirty="0" err="1"/>
-              <a:t>git</a:t>
+              <a:t>-</a:t>
+            </a:r>
+            <a:r>
+              <a:rPr lang="en-US" dirty="0" smtClean="0"/>
+              <a:t>cited </a:t>
             </a:r>
             <a:r>
               <a:rPr lang="en-US" dirty="0"/>
-              <a:t>.</a:t>
-            </a:r>
+              <a:t>in Seibel, Peter (2009). </a:t>
+            </a:r>
+            <a:r>
+              <a:rPr lang="en-US" i="1" dirty="0"/>
+              <a:t>Coders At Work</a:t>
+            </a:r>
+            <a:r>
+              <a:rPr lang="en-US" dirty="0"/>
+              <a:t>. p. 475.</a:t>
+            </a:r>
+          </a:p>
+          <a:p>
+            <a:r>
+              <a:rPr lang="en-US" dirty="0"/>
+              <a:t/>
+            </a:r>
+            <a:br>
+              <a:rPr lang="en-US" dirty="0"/>
+            </a:br>
+            <a:endParaRPr lang="en-US" dirty="0"/>
           </a:p>
         </p:txBody>
       </p:sp>
@@ -6530,7 +6487,7 @@
           <a:p>
             <a:r>
               <a:rPr lang="en-US" dirty="0" smtClean="0"/>
-              <a:t>Linus on C++ Continued</a:t>
+              <a:t>Ken Thompson on C++</a:t>
             </a:r>
             <a:endParaRPr lang="en-US" dirty="0"/>
           </a:p>
@@ -6539,7 +6496,7 @@
     </p:spTree>
     <p:extLst>
       <p:ext uri="{BB962C8B-B14F-4D97-AF65-F5344CB8AC3E}">
-        <p14:creationId xmlns:p14="http://schemas.microsoft.com/office/powerpoint/2010/main" val="741281212"/>
+        <p14:creationId xmlns:p14="http://schemas.microsoft.com/office/powerpoint/2010/main" val="911725774"/>
       </p:ext>
     </p:extLst>
   </p:cSld>
@@ -6568,139 +6525,6 @@
       </p:grpSpPr>
       <p:sp>
         <p:nvSpPr>
-          <p:cNvPr id="2" name="Content Placeholder 1"/>
-          <p:cNvSpPr>
-            <a:spLocks noGrp="1"/>
-          </p:cNvSpPr>
-          <p:nvPr>
-            <p:ph sz="quarter" idx="13"/>
-          </p:nvPr>
-        </p:nvSpPr>
-        <p:spPr/>
-        <p:txBody>
-          <a:bodyPr/>
-          <a:lstStyle/>
-          <a:p>
-            <a:r>
-              <a:rPr lang="en-US" dirty="0" smtClean="0"/>
-              <a:t>“It </a:t>
-            </a:r>
-            <a:r>
-              <a:rPr lang="en-US" dirty="0"/>
-              <a:t>certainly has its good points. But by and large I think it's a bad language. It does a lot of things half well and it's just a garbage heap of ideas that are mutually exclusive. Everybody I know, whether it's personal or corporate, selects a subset and these subsets are different. So it's not a good language to transport an algorithm -- to say, "I wrote it; here, take it." It's way too big, way too complex. And it's obviously built by committee</a:t>
-            </a:r>
-            <a:r>
-              <a:rPr lang="en-US" dirty="0" smtClean="0"/>
-              <a:t>.”</a:t>
-            </a:r>
-          </a:p>
-          <a:p>
-            <a:r>
-              <a:rPr lang="en-US" dirty="0" smtClean="0"/>
-              <a:t>“When </a:t>
-            </a:r>
-            <a:r>
-              <a:rPr lang="en-US" dirty="0" err="1"/>
-              <a:t>Stroustrup</a:t>
-            </a:r>
-            <a:r>
-              <a:rPr lang="en-US" dirty="0"/>
-              <a:t> read the interview he came screaming into my room about how I was undermining him and what I said mattered and I said it was a bad </a:t>
-            </a:r>
-            <a:r>
-              <a:rPr lang="en-US" dirty="0" smtClean="0"/>
-              <a:t>language.”</a:t>
-            </a:r>
-          </a:p>
-          <a:p>
-            <a:r>
-              <a:rPr lang="en-US" dirty="0"/>
-              <a:t>-</a:t>
-            </a:r>
-            <a:r>
-              <a:rPr lang="en-US" dirty="0" smtClean="0"/>
-              <a:t>cited </a:t>
-            </a:r>
-            <a:r>
-              <a:rPr lang="en-US" dirty="0"/>
-              <a:t>in Seibel, Peter (2009). </a:t>
-            </a:r>
-            <a:r>
-              <a:rPr lang="en-US" i="1" dirty="0"/>
-              <a:t>Coders At Work</a:t>
-            </a:r>
-            <a:r>
-              <a:rPr lang="en-US" dirty="0"/>
-              <a:t>. p. 475.</a:t>
-            </a:r>
-          </a:p>
-          <a:p>
-            <a:r>
-              <a:rPr lang="en-US" dirty="0"/>
-              <a:t/>
-            </a:r>
-            <a:br>
-              <a:rPr lang="en-US" dirty="0"/>
-            </a:br>
-            <a:endParaRPr lang="en-US" dirty="0"/>
-          </a:p>
-        </p:txBody>
-      </p:sp>
-      <p:sp>
-        <p:nvSpPr>
-          <p:cNvPr id="3" name="Title 2"/>
-          <p:cNvSpPr>
-            <a:spLocks noGrp="1"/>
-          </p:cNvSpPr>
-          <p:nvPr>
-            <p:ph type="title"/>
-          </p:nvPr>
-        </p:nvSpPr>
-        <p:spPr/>
-        <p:txBody>
-          <a:bodyPr/>
-          <a:lstStyle/>
-          <a:p>
-            <a:r>
-              <a:rPr lang="en-US" dirty="0" smtClean="0"/>
-              <a:t>Ken Thompson on C++</a:t>
-            </a:r>
-            <a:endParaRPr lang="en-US" dirty="0"/>
-          </a:p>
-        </p:txBody>
-      </p:sp>
-    </p:spTree>
-    <p:extLst>
-      <p:ext uri="{BB962C8B-B14F-4D97-AF65-F5344CB8AC3E}">
-        <p14:creationId xmlns:p14="http://schemas.microsoft.com/office/powerpoint/2010/main" val="911725774"/>
-      </p:ext>
-    </p:extLst>
-  </p:cSld>
-  <p:clrMapOvr>
-    <a:masterClrMapping/>
-  </p:clrMapOvr>
-</p:sld>
-</file>
-
-<file path=ppt/slides/slide22.xml><?xml version="1.0" encoding="utf-8"?>
-<p:sld xmlns:a="http://schemas.openxmlformats.org/drawingml/2006/main" xmlns:r="http://schemas.openxmlformats.org/officeDocument/2006/relationships" xmlns:p="http://schemas.openxmlformats.org/presentationml/2006/main">
-  <p:cSld>
-    <p:spTree>
-      <p:nvGrpSpPr>
-        <p:cNvPr id="1" name=""/>
-        <p:cNvGrpSpPr/>
-        <p:nvPr/>
-      </p:nvGrpSpPr>
-      <p:grpSpPr>
-        <a:xfrm>
-          <a:off x="0" y="0"/>
-          <a:ext cx="0" cy="0"/>
-          <a:chOff x="0" y="0"/>
-          <a:chExt cx="0" cy="0"/>
-        </a:xfrm>
-      </p:grpSpPr>
-      <p:sp>
-        <p:nvSpPr>
           <p:cNvPr id="3" name="Content Placeholder 2"/>
           <p:cNvSpPr>
             <a:spLocks noGrp="1"/>
@@ -6880,7 +6704,7 @@
 </p:sld>
 </file>
 
-<file path=ppt/slides/slide23.xml><?xml version="1.0" encoding="utf-8"?>
+<file path=ppt/slides/slide22.xml><?xml version="1.0" encoding="utf-8"?>
 <p:sld xmlns:a="http://schemas.openxmlformats.org/drawingml/2006/main" xmlns:r="http://schemas.openxmlformats.org/officeDocument/2006/relationships" xmlns:p="http://schemas.openxmlformats.org/presentationml/2006/main">
   <p:cSld>
     <p:spTree>
@@ -7512,11 +7336,7 @@
           <a:p>
             <a:r>
               <a:rPr lang="en-US" dirty="0" smtClean="0"/>
-              <a:t>Is </a:t>
-            </a:r>
-            <a:r>
-              <a:rPr lang="en-US" dirty="0" smtClean="0"/>
-              <a:t>C Obsolete?  Is it a true assertion?</a:t>
+              <a:t>Is C Obsolete?  Is it a true assertion?</a:t>
             </a:r>
             <a:endParaRPr lang="en-US" dirty="0"/>
           </a:p>
@@ -7607,11 +7427,7 @@
           <a:p>
             <a:r>
               <a:rPr lang="en-US" dirty="0" smtClean="0"/>
-              <a:t>“There is no circumstance EVER when C is appropriate</a:t>
-            </a:r>
-            <a:r>
-              <a:rPr lang="en-US" dirty="0" smtClean="0"/>
-              <a:t>.”</a:t>
+              <a:t>“There is no circumstance EVER when C is appropriate.”</a:t>
             </a:r>
           </a:p>
           <a:p>
@@ -7692,7 +7508,7 @@
       </p:grpSpPr>
       <p:sp>
         <p:nvSpPr>
-          <p:cNvPr id="2" name="Content Placeholder 1"/>
+          <p:cNvPr id="3" name="Content Placeholder 2"/>
           <p:cNvSpPr>
             <a:spLocks noGrp="1"/>
           </p:cNvSpPr>
@@ -7707,25 +7523,53 @@
           <a:p>
             <a:r>
               <a:rPr lang="en-US" dirty="0" smtClean="0"/>
-              <a:t>The Perspective coming from the Committee is all about </a:t>
-            </a:r>
-            <a:r>
-              <a:rPr lang="en-US" dirty="0" smtClean="0"/>
-              <a:t>features, academia.</a:t>
-            </a:r>
-            <a:endParaRPr lang="en-US" dirty="0" smtClean="0"/>
-          </a:p>
-          <a:p>
-            <a:pPr lvl="1" indent="0">
-              <a:buNone/>
-            </a:pPr>
-            <a:endParaRPr lang="en-US" dirty="0"/>
-          </a:p>
-          <a:p>
-            <a:pPr marL="285750" indent="-285750"/>
-            <a:r>
-              <a:rPr lang="en-US" dirty="0" smtClean="0"/>
-              <a:t>I have a Testing POV.</a:t>
+              <a:t>C Respects You (The Spirit of C)</a:t>
+            </a:r>
+          </a:p>
+          <a:p>
+            <a:r>
+              <a:rPr lang="en-US" dirty="0" smtClean="0"/>
+              <a:t>C Has a Small Feature Set</a:t>
+            </a:r>
+          </a:p>
+          <a:p>
+            <a:pPr lvl="1"/>
+            <a:r>
+              <a:rPr lang="en-US" dirty="0" smtClean="0"/>
+              <a:t>C is a Great Language for Electrical Engineers</a:t>
+            </a:r>
+          </a:p>
+          <a:p>
+            <a:r>
+              <a:rPr lang="en-US" dirty="0" smtClean="0"/>
+              <a:t>C Has a Stable ABI</a:t>
+            </a:r>
+          </a:p>
+          <a:p>
+            <a:pPr lvl="1"/>
+            <a:r>
+              <a:rPr lang="en-US" dirty="0" smtClean="0"/>
+              <a:t>C++ breaks ABI by design every major release</a:t>
+            </a:r>
+          </a:p>
+          <a:p>
+            <a:r>
+              <a:rPr lang="en-US" dirty="0" smtClean="0"/>
+              <a:t>C is the </a:t>
+            </a:r>
+            <a:r>
+              <a:rPr lang="en-US" dirty="0"/>
+              <a:t>language of Unix-style Kernels </a:t>
+            </a:r>
+            <a:r>
+              <a:rPr lang="en-US" dirty="0" smtClean="0"/>
+              <a:t>(see man 2)</a:t>
+            </a:r>
+          </a:p>
+          <a:p>
+            <a:r>
+              <a:rPr lang="en-US" dirty="0" smtClean="0"/>
+              <a:t>C Helps You Think Like a Computer</a:t>
             </a:r>
           </a:p>
           <a:p>
@@ -7735,7 +7579,7 @@
             </a:pPr>
             <a:r>
               <a:rPr lang="en-US" dirty="0" smtClean="0"/>
-              <a:t>I know where the “dead bodies are buried.”</a:t>
+              <a:t>C++ paradigm: all about the code, real world modeling</a:t>
             </a:r>
           </a:p>
           <a:p>
@@ -7745,21 +7589,8 @@
             </a:pPr>
             <a:r>
               <a:rPr lang="en-US" dirty="0" smtClean="0"/>
-              <a:t>I have tested every VC C++ Library</a:t>
-            </a:r>
-          </a:p>
-          <a:p>
-            <a:pPr marL="285750" indent="-285750">
-              <a:buFont typeface="Arial" panose="020B0604020202020204" pitchFamily="34" charset="0"/>
-              <a:buChar char="•"/>
-            </a:pPr>
-            <a:r>
-              <a:rPr lang="en-US" dirty="0" smtClean="0"/>
-              <a:t>More on that later…</a:t>
-            </a:r>
-          </a:p>
-          <a:p>
-            <a:endParaRPr lang="en-US" dirty="0" smtClean="0"/>
+              <a:t>C paradigm: about the data</a:t>
+            </a:r>
           </a:p>
           <a:p>
             <a:endParaRPr lang="en-US" dirty="0"/>
@@ -7768,7 +7599,7 @@
       </p:sp>
       <p:sp>
         <p:nvSpPr>
-          <p:cNvPr id="3" name="Title 2"/>
+          <p:cNvPr id="2" name="Title 1"/>
           <p:cNvSpPr>
             <a:spLocks noGrp="1"/>
           </p:cNvSpPr>
@@ -7778,12 +7609,14 @@
         </p:nvSpPr>
         <p:spPr/>
         <p:txBody>
-          <a:bodyPr/>
-          <a:lstStyle/>
-          <a:p>
-            <a:r>
-              <a:rPr lang="en-US" dirty="0" smtClean="0"/>
-              <a:t>A Different Perspective</a:t>
+          <a:bodyPr>
+            <a:normAutofit/>
+          </a:bodyPr>
+          <a:lstStyle/>
+          <a:p>
+            <a:r>
+              <a:rPr lang="en-US" dirty="0" smtClean="0"/>
+              <a:t>C Strengths</a:t>
             </a:r>
             <a:endParaRPr lang="en-US" dirty="0"/>
           </a:p>
@@ -7792,7 +7625,7 @@
     </p:spTree>
     <p:extLst>
       <p:ext uri="{BB962C8B-B14F-4D97-AF65-F5344CB8AC3E}">
-        <p14:creationId xmlns:p14="http://schemas.microsoft.com/office/powerpoint/2010/main" val="328049934"/>
+        <p14:creationId xmlns:p14="http://schemas.microsoft.com/office/powerpoint/2010/main" val="1327051054"/>
       </p:ext>
     </p:extLst>
   </p:cSld>
@@ -7831,99 +7664,6 @@
         </p:nvSpPr>
         <p:spPr/>
         <p:txBody>
-          <a:bodyPr/>
-          <a:lstStyle/>
-          <a:p>
-            <a:r>
-              <a:rPr lang="en-US" dirty="0" smtClean="0"/>
-              <a:t>C Respects You (The Spirit of C)</a:t>
-            </a:r>
-            <a:endParaRPr lang="en-US" dirty="0" smtClean="0"/>
-          </a:p>
-          <a:p>
-            <a:r>
-              <a:rPr lang="en-US" dirty="0" smtClean="0"/>
-              <a:t>C Has a Small Feature Set</a:t>
-            </a:r>
-          </a:p>
-          <a:p>
-            <a:pPr lvl="1"/>
-            <a:r>
-              <a:rPr lang="en-US" dirty="0" smtClean="0"/>
-              <a:t>C is a Great Language for Electrical Engineers</a:t>
-            </a:r>
-          </a:p>
-          <a:p>
-            <a:r>
-              <a:rPr lang="en-US" dirty="0" smtClean="0"/>
-              <a:t>C Has a Stable ABI</a:t>
-            </a:r>
-          </a:p>
-          <a:p>
-            <a:pPr lvl="1"/>
-            <a:r>
-              <a:rPr lang="en-US" dirty="0" smtClean="0"/>
-              <a:t>C++ breaks ABI by design every major release</a:t>
-            </a:r>
-          </a:p>
-          <a:p>
-            <a:r>
-              <a:rPr lang="en-US" dirty="0" smtClean="0"/>
-              <a:t>C is the </a:t>
-            </a:r>
-            <a:r>
-              <a:rPr lang="en-US" dirty="0"/>
-              <a:t>language of Unix-style Kernels </a:t>
-            </a:r>
-            <a:r>
-              <a:rPr lang="en-US" dirty="0" smtClean="0"/>
-              <a:t>(see man 2)</a:t>
-            </a:r>
-            <a:endParaRPr lang="en-US" dirty="0" smtClean="0"/>
-          </a:p>
-          <a:p>
-            <a:r>
-              <a:rPr lang="en-US" dirty="0" smtClean="0"/>
-              <a:t>C Helps You Think Like a Computer</a:t>
-            </a:r>
-          </a:p>
-          <a:p>
-            <a:pPr marL="285750" indent="-285750">
-              <a:buFont typeface="Arial" panose="020B0604020202020204" pitchFamily="34" charset="0"/>
-              <a:buChar char="•"/>
-            </a:pPr>
-            <a:r>
-              <a:rPr lang="en-US" dirty="0" smtClean="0"/>
-              <a:t>C++ paradigm: all about the code, real world modeling</a:t>
-            </a:r>
-          </a:p>
-          <a:p>
-            <a:pPr marL="285750" indent="-285750">
-              <a:buFont typeface="Arial" panose="020B0604020202020204" pitchFamily="34" charset="0"/>
-              <a:buChar char="•"/>
-            </a:pPr>
-            <a:r>
-              <a:rPr lang="en-US" dirty="0" smtClean="0"/>
-              <a:t>C paradigm: about the data</a:t>
-            </a:r>
-          </a:p>
-          <a:p>
-            <a:endParaRPr lang="en-US" dirty="0"/>
-          </a:p>
-        </p:txBody>
-      </p:sp>
-      <p:sp>
-        <p:nvSpPr>
-          <p:cNvPr id="2" name="Title 1"/>
-          <p:cNvSpPr>
-            <a:spLocks noGrp="1"/>
-          </p:cNvSpPr>
-          <p:nvPr>
-            <p:ph type="title"/>
-          </p:nvPr>
-        </p:nvSpPr>
-        <p:spPr/>
-        <p:txBody>
           <a:bodyPr>
             <a:normAutofit/>
           </a:bodyPr>
@@ -7931,7 +7671,115 @@
           <a:p>
             <a:r>
               <a:rPr lang="en-US" dirty="0" smtClean="0"/>
-              <a:t>C Strengths</a:t>
+              <a:t>Popular </a:t>
+            </a:r>
+            <a:r>
+              <a:rPr lang="en-US" dirty="0"/>
+              <a:t>in the Microcontroller realm</a:t>
+            </a:r>
+          </a:p>
+          <a:p>
+            <a:r>
+              <a:rPr lang="en-US" dirty="0" smtClean="0"/>
+              <a:t>Approved by Mission Critical Standards</a:t>
+            </a:r>
+          </a:p>
+          <a:p>
+            <a:pPr lvl="1"/>
+            <a:r>
+              <a:rPr lang="en-US" dirty="0" smtClean="0"/>
+              <a:t>Modern C++ is not allowed by MISRA etc.</a:t>
+            </a:r>
+          </a:p>
+          <a:p>
+            <a:pPr lvl="1"/>
+            <a:r>
+              <a:rPr lang="en-US" dirty="0" smtClean="0"/>
+              <a:t>IAR Embedded Workbench C++98/03</a:t>
+            </a:r>
+          </a:p>
+          <a:p>
+            <a:r>
+              <a:rPr lang="en-US" dirty="0" smtClean="0"/>
+              <a:t>C is able to implement C++ features</a:t>
+            </a:r>
+          </a:p>
+          <a:p>
+            <a:pPr lvl="1"/>
+            <a:r>
+              <a:rPr lang="en-US" dirty="0" err="1" smtClean="0"/>
+              <a:t>Pimpl</a:t>
+            </a:r>
+            <a:r>
+              <a:rPr lang="en-US" dirty="0" smtClean="0"/>
+              <a:t> idiom (interfaces)</a:t>
+            </a:r>
+          </a:p>
+          <a:p>
+            <a:pPr lvl="1"/>
+            <a:r>
+              <a:rPr lang="en-US" dirty="0" smtClean="0"/>
+              <a:t>Generics, polymorphism</a:t>
+            </a:r>
+          </a:p>
+          <a:p>
+            <a:pPr lvl="1"/>
+            <a:endParaRPr lang="en-US" dirty="0"/>
+          </a:p>
+          <a:p>
+            <a:pPr marL="0" lvl="1" indent="0">
+              <a:buNone/>
+            </a:pPr>
+            <a:r>
+              <a:rPr lang="en-US" dirty="0" smtClean="0"/>
+              <a:t>C Libraries  for Developers are NOT header based</a:t>
+            </a:r>
+          </a:p>
+          <a:p>
+            <a:pPr lvl="1"/>
+            <a:r>
+              <a:rPr lang="en-US" dirty="0" smtClean="0"/>
+              <a:t>MS09-035</a:t>
+            </a:r>
+          </a:p>
+          <a:p>
+            <a:pPr lvl="1"/>
+            <a:r>
+              <a:rPr lang="en-US" dirty="0"/>
+              <a:t>Active Template Library Security Update for Developers</a:t>
+            </a:r>
+          </a:p>
+          <a:p>
+            <a:pPr lvl="1"/>
+            <a:r>
+              <a:rPr lang="en-US" dirty="0"/>
+              <a:t>Attention Customers!!!!</a:t>
+            </a:r>
+          </a:p>
+          <a:p>
+            <a:pPr lvl="1"/>
+            <a:endParaRPr lang="en-US" dirty="0"/>
+          </a:p>
+        </p:txBody>
+      </p:sp>
+      <p:sp>
+        <p:nvSpPr>
+          <p:cNvPr id="2" name="Title 1"/>
+          <p:cNvSpPr>
+            <a:spLocks noGrp="1"/>
+          </p:cNvSpPr>
+          <p:nvPr>
+            <p:ph type="title"/>
+          </p:nvPr>
+        </p:nvSpPr>
+        <p:spPr/>
+        <p:txBody>
+          <a:bodyPr/>
+          <a:lstStyle/>
+          <a:p>
+            <a:r>
+              <a:rPr lang="en-US" dirty="0" smtClean="0"/>
+              <a:t>(continued.)</a:t>
             </a:r>
             <a:endParaRPr lang="en-US" dirty="0"/>
           </a:p>
@@ -7940,7 +7788,7 @@
     </p:spTree>
     <p:extLst>
       <p:ext uri="{BB962C8B-B14F-4D97-AF65-F5344CB8AC3E}">
-        <p14:creationId xmlns:p14="http://schemas.microsoft.com/office/powerpoint/2010/main" val="1327051054"/>
+        <p14:creationId xmlns:p14="http://schemas.microsoft.com/office/powerpoint/2010/main" val="3273235548"/>
       </p:ext>
     </p:extLst>
   </p:cSld>

</xml_diff>